<commit_message>
Update figures so theta is outside plate
</commit_message>
<xml_diff>
--- a/assets/PGMs.pptx
+++ b/assets/PGMs.pptx
@@ -6252,8 +6252,8 @@
         </p:nvSpPr>
         <p:spPr>
           <a:xfrm>
-            <a:off x="6096000" y="2414896"/>
-            <a:ext cx="1112668" cy="2101352"/>
+            <a:off x="6096000" y="3357508"/>
+            <a:ext cx="1112668" cy="1158740"/>
           </a:xfrm>
           <a:prstGeom prst="roundRect">
             <a:avLst/>
@@ -7604,7 +7604,7 @@
             </p:nvSpPr>
             <p:spPr>
               <a:xfrm>
-                <a:off x="6311323" y="2601843"/>
+                <a:off x="5988294" y="2470464"/>
                 <a:ext cx="618744" cy="618744"/>
               </a:xfrm>
               <a:prstGeom prst="ellipse">
@@ -7641,31 +7641,12 @@
                       <m:jc m:val="centerGroup"/>
                     </m:oMathParaPr>
                     <m:oMath xmlns:m="http://schemas.openxmlformats.org/officeDocument/2006/math">
-                      <m:sSub>
-                        <m:sSubPr>
-                          <m:ctrlPr>
-                            <a:rPr lang="da-DK" b="0" i="1" smtClean="0">
-                              <a:latin typeface="Cambria Math" panose="02040503050406030204" pitchFamily="18" charset="0"/>
-                            </a:rPr>
-                          </m:ctrlPr>
-                        </m:sSubPr>
-                        <m:e>
-                          <m:r>
-                            <a:rPr lang="da-DK" b="0" i="1" smtClean="0">
-                              <a:latin typeface="Cambria Math" panose="02040503050406030204" pitchFamily="18" charset="0"/>
-                            </a:rPr>
-                            <m:t>𝜃</m:t>
-                          </m:r>
-                        </m:e>
-                        <m:sub>
-                          <m:r>
-                            <a:rPr lang="da-DK" b="0" i="1" smtClean="0">
-                              <a:latin typeface="Cambria Math" panose="02040503050406030204" pitchFamily="18" charset="0"/>
-                            </a:rPr>
-                            <m:t>𝑘</m:t>
-                          </m:r>
-                        </m:sub>
-                      </m:sSub>
+                      <m:r>
+                        <a:rPr lang="da-DK" b="0" i="1" smtClean="0">
+                          <a:latin typeface="Cambria Math" panose="02040503050406030204" pitchFamily="18" charset="0"/>
+                        </a:rPr>
+                        <m:t>𝜃</m:t>
+                      </m:r>
                     </m:oMath>
                   </m:oMathPara>
                 </a14:m>
@@ -7691,7 +7672,7 @@
             </p:nvSpPr>
             <p:spPr>
               <a:xfrm>
-                <a:off x="6311323" y="2601843"/>
+                <a:off x="5988294" y="2470464"/>
                 <a:ext cx="618744" cy="618744"/>
               </a:xfrm>
               <a:prstGeom prst="ellipse">
@@ -7742,8 +7723,8 @@
         </p:nvCxnSpPr>
         <p:spPr>
           <a:xfrm flipH="1">
-            <a:off x="5005793" y="3129974"/>
-            <a:ext cx="1396143" cy="227534"/>
+            <a:off x="5005793" y="2998595"/>
+            <a:ext cx="1073114" cy="358913"/>
           </a:xfrm>
           <a:prstGeom prst="straightConnector1">
             <a:avLst/>

</xml_diff>

<commit_message>
Changed figures to be small and updated latency
</commit_message>
<xml_diff>
--- a/assets/PGMs.pptx
+++ b/assets/PGMs.pptx
@@ -5742,9 +5742,7 @@
                 <a:avLst/>
               </a:prstGeom>
               <a:solidFill>
-                <a:schemeClr val="bg1">
-                  <a:lumMod val="75000"/>
-                </a:schemeClr>
+                <a:schemeClr val="bg1"/>
               </a:solidFill>
               <a:ln>
                 <a:solidFill>
@@ -6252,7 +6250,7 @@
         </p:nvSpPr>
         <p:spPr>
           <a:xfrm>
-            <a:off x="6096000" y="3357508"/>
+            <a:off x="5772759" y="3357508"/>
             <a:ext cx="1112668" cy="1158740"/>
           </a:xfrm>
           <a:prstGeom prst="roundRect">
@@ -6263,7 +6261,7 @@
               <a:lumMod val="95000"/>
             </a:schemeClr>
           </a:solidFill>
-          <a:ln>
+          <a:ln w="12700">
             <a:solidFill>
               <a:schemeClr val="tx1"/>
             </a:solidFill>
@@ -6288,7 +6286,7 @@
           <a:lstStyle/>
           <a:p>
             <a:pPr algn="ctr"/>
-            <a:endParaRPr lang="en-DK"/>
+            <a:endParaRPr lang="en-DK" sz="2400"/>
           </a:p>
         </p:txBody>
       </p:sp>
@@ -6306,8 +6304,8 @@
         </p:nvSpPr>
         <p:spPr>
           <a:xfrm>
-            <a:off x="6809173" y="4129507"/>
-            <a:ext cx="588442" cy="369332"/>
+            <a:off x="6430059" y="4075855"/>
+            <a:ext cx="588442" cy="461665"/>
           </a:xfrm>
           <a:prstGeom prst="rect">
             <a:avLst/>
@@ -6321,12 +6319,12 @@
           <a:lstStyle/>
           <a:p>
             <a:r>
-              <a:rPr lang="da-DK" b="1" dirty="0">
+              <a:rPr lang="da-DK" sz="2400" b="1" dirty="0">
                 <a:latin typeface="Helvetica" pitchFamily="2" charset="0"/>
               </a:rPr>
               <a:t>K</a:t>
             </a:r>
-            <a:endParaRPr lang="en-DK" b="1" dirty="0">
+            <a:endParaRPr lang="en-DK" sz="2400" b="1" dirty="0">
               <a:latin typeface="Helvetica" pitchFamily="2" charset="0"/>
             </a:endParaRPr>
           </a:p>
@@ -6346,8 +6344,8 @@
         </p:nvSpPr>
         <p:spPr>
           <a:xfrm>
-            <a:off x="3737165" y="1759701"/>
-            <a:ext cx="2016800" cy="3254799"/>
+            <a:off x="3900541" y="1837682"/>
+            <a:ext cx="1714723" cy="3176818"/>
           </a:xfrm>
           <a:prstGeom prst="roundRect">
             <a:avLst/>
@@ -6357,7 +6355,7 @@
               <a:lumMod val="95000"/>
             </a:schemeClr>
           </a:solidFill>
-          <a:ln>
+          <a:ln w="12700">
             <a:solidFill>
               <a:schemeClr val="tx1"/>
             </a:solidFill>
@@ -6382,7 +6380,7 @@
           <a:lstStyle/>
           <a:p>
             <a:pPr algn="ctr"/>
-            <a:endParaRPr lang="en-DK"/>
+            <a:endParaRPr lang="en-DK" sz="2400"/>
           </a:p>
         </p:txBody>
       </p:sp>
@@ -6447,14 +6445,14 @@
                       <m:sSub>
                         <m:sSubPr>
                           <m:ctrlPr>
-                            <a:rPr lang="da-DK" b="0" i="1" dirty="0" smtClean="0">
+                            <a:rPr lang="da-DK" sz="2400" b="0" i="1" dirty="0" smtClean="0">
                               <a:latin typeface="Cambria Math" panose="02040503050406030204" pitchFamily="18" charset="0"/>
                             </a:rPr>
                           </m:ctrlPr>
                         </m:sSubPr>
                         <m:e>
                           <m:r>
-                            <a:rPr lang="en-GB" i="1" dirty="0" smtClean="0">
+                            <a:rPr lang="en-GB" sz="2400" i="1" dirty="0" smtClean="0">
                               <a:latin typeface="Cambria Math" panose="02040503050406030204" pitchFamily="18" charset="0"/>
                             </a:rPr>
                             <m:t>𝑦</m:t>
@@ -6462,7 +6460,7 @@
                         </m:e>
                         <m:sub>
                           <m:r>
-                            <a:rPr lang="da-DK" b="0" i="1" dirty="0" smtClean="0">
+                            <a:rPr lang="da-DK" sz="2400" b="0" i="1" dirty="0" smtClean="0">
                               <a:latin typeface="Cambria Math" panose="02040503050406030204" pitchFamily="18" charset="0"/>
                             </a:rPr>
                             <m:t>𝑛</m:t>
@@ -6472,7 +6470,7 @@
                     </m:oMath>
                   </m:oMathPara>
                 </a14:m>
-                <a:endParaRPr lang="en-DK" dirty="0"/>
+                <a:endParaRPr lang="en-DK" sz="2400" dirty="0"/>
               </a:p>
             </p:txBody>
           </p:sp>
@@ -6588,14 +6586,14 @@
                       <m:sSubSup>
                         <m:sSubSupPr>
                           <m:ctrlPr>
-                            <a:rPr lang="da-DK" b="0" i="1" smtClean="0">
+                            <a:rPr lang="da-DK" sz="2400" b="0" i="1" smtClean="0">
                               <a:latin typeface="Cambria Math" panose="02040503050406030204" pitchFamily="18" charset="0"/>
                             </a:rPr>
                           </m:ctrlPr>
                         </m:sSubSupPr>
                         <m:e>
                           <m:r>
-                            <a:rPr lang="da-DK" b="0" i="1" smtClean="0">
+                            <a:rPr lang="da-DK" sz="2400" b="0" i="1" smtClean="0">
                               <a:latin typeface="Cambria Math" panose="02040503050406030204" pitchFamily="18" charset="0"/>
                             </a:rPr>
                             <m:t>𝑥</m:t>
@@ -6603,7 +6601,7 @@
                         </m:e>
                         <m:sub>
                           <m:r>
-                            <a:rPr lang="da-DK" b="0" i="1" smtClean="0">
+                            <a:rPr lang="da-DK" sz="2400" b="0" i="1" smtClean="0">
                               <a:latin typeface="Cambria Math" panose="02040503050406030204" pitchFamily="18" charset="0"/>
                             </a:rPr>
                             <m:t>𝑛</m:t>
@@ -6611,7 +6609,7 @@
                         </m:sub>
                         <m:sup>
                           <m:r>
-                            <a:rPr lang="da-DK" b="0" i="1" smtClean="0">
+                            <a:rPr lang="da-DK" sz="2400" b="0" i="1" smtClean="0">
                               <a:latin typeface="Cambria Math" panose="02040503050406030204" pitchFamily="18" charset="0"/>
                             </a:rPr>
                             <m:t>′</m:t>
@@ -6621,7 +6619,7 @@
                     </m:oMath>
                   </m:oMathPara>
                 </a14:m>
-                <a:endParaRPr lang="en-DK" dirty="0"/>
+                <a:endParaRPr lang="en-DK" sz="2400" dirty="0"/>
               </a:p>
             </p:txBody>
           </p:sp>
@@ -6692,7 +6690,7 @@
             </p:nvSpPr>
             <p:spPr>
               <a:xfrm>
-                <a:off x="6311323" y="3493356"/>
+                <a:off x="5988082" y="3493356"/>
                 <a:ext cx="618744" cy="618744"/>
               </a:xfrm>
               <a:prstGeom prst="ellipse">
@@ -6732,14 +6730,14 @@
                       <m:sSub>
                         <m:sSubPr>
                           <m:ctrlPr>
-                            <a:rPr lang="da-DK" b="0" i="1" smtClean="0">
+                            <a:rPr lang="da-DK" sz="2400" b="0" i="1" smtClean="0">
                               <a:latin typeface="Cambria Math" panose="02040503050406030204" pitchFamily="18" charset="0"/>
                             </a:rPr>
                           </m:ctrlPr>
                         </m:sSubPr>
                         <m:e>
                           <m:r>
-                            <a:rPr lang="da-DK" b="0" i="1" smtClean="0">
+                            <a:rPr lang="da-DK" sz="2400" b="0" i="1" smtClean="0">
                               <a:latin typeface="Cambria Math" panose="02040503050406030204" pitchFamily="18" charset="0"/>
                             </a:rPr>
                             <m:t>𝛽</m:t>
@@ -6747,7 +6745,7 @@
                         </m:e>
                         <m:sub>
                           <m:r>
-                            <a:rPr lang="da-DK" b="0" i="1" smtClean="0">
+                            <a:rPr lang="da-DK" sz="2400" b="0" i="1" smtClean="0">
                               <a:latin typeface="Cambria Math" panose="02040503050406030204" pitchFamily="18" charset="0"/>
                             </a:rPr>
                             <m:t>𝑘</m:t>
@@ -6757,7 +6755,7 @@
                     </m:oMath>
                   </m:oMathPara>
                 </a14:m>
-                <a:endParaRPr lang="en-DK" dirty="0"/>
+                <a:endParaRPr lang="en-DK" sz="2400" dirty="0"/>
               </a:p>
             </p:txBody>
           </p:sp>
@@ -6779,7 +6777,7 @@
             </p:nvSpPr>
             <p:spPr>
               <a:xfrm>
-                <a:off x="6311323" y="3493356"/>
+                <a:off x="5988082" y="3493356"/>
                 <a:ext cx="618744" cy="618744"/>
               </a:xfrm>
               <a:prstGeom prst="ellipse">
@@ -6788,7 +6786,7 @@
               <a:blipFill>
                 <a:blip r:embed="rId4"/>
                 <a:stretch>
-                  <a:fillRect/>
+                  <a:fillRect l="-2885"/>
                 </a:stretch>
               </a:blipFill>
               <a:ln>
@@ -6828,8 +6826,8 @@
             </p:nvSpPr>
             <p:spPr>
               <a:xfrm>
-                <a:off x="4531568" y="5293545"/>
-                <a:ext cx="351635" cy="369332"/>
+                <a:off x="3283583" y="4149014"/>
+                <a:ext cx="351635" cy="461665"/>
               </a:xfrm>
               <a:prstGeom prst="rect">
                 <a:avLst/>
@@ -6849,7 +6847,7 @@
                     </m:oMathParaPr>
                     <m:oMath xmlns:m="http://schemas.openxmlformats.org/officeDocument/2006/math">
                       <m:r>
-                        <a:rPr lang="da-DK" b="0" i="1" smtClean="0">
+                        <a:rPr lang="da-DK" sz="2400" b="0" i="1" smtClean="0">
                           <a:latin typeface="Cambria Math" panose="02040503050406030204" pitchFamily="18" charset="0"/>
                         </a:rPr>
                         <m:t>𝑟</m:t>
@@ -6857,7 +6855,7 @@
                     </m:oMath>
                   </m:oMathPara>
                 </a14:m>
-                <a:endParaRPr lang="en-DK" dirty="0"/>
+                <a:endParaRPr lang="en-DK" sz="2400" dirty="0"/>
               </a:p>
             </p:txBody>
           </p:sp>
@@ -6879,8 +6877,8 @@
             </p:nvSpPr>
             <p:spPr>
               <a:xfrm>
-                <a:off x="4531568" y="5293545"/>
-                <a:ext cx="351635" cy="369332"/>
+                <a:off x="3283583" y="4149014"/>
+                <a:ext cx="351635" cy="461665"/>
               </a:xfrm>
               <a:prstGeom prst="rect">
                 <a:avLst/>
@@ -6888,7 +6886,7 @@
               <a:blipFill>
                 <a:blip r:embed="rId5"/>
                 <a:stretch>
-                  <a:fillRect/>
+                  <a:fillRect l="-3509"/>
                 </a:stretch>
               </a:blipFill>
             </p:spPr>
@@ -6930,9 +6928,7 @@
                 <a:avLst/>
               </a:prstGeom>
               <a:solidFill>
-                <a:schemeClr val="bg1">
-                  <a:lumMod val="75000"/>
-                </a:schemeClr>
+                <a:schemeClr val="bg1"/>
               </a:solidFill>
               <a:ln>
                 <a:solidFill>
@@ -6968,14 +6964,14 @@
                       <m:sSub>
                         <m:sSubPr>
                           <m:ctrlPr>
-                            <a:rPr lang="da-DK" b="0" i="1" dirty="0" smtClean="0">
+                            <a:rPr lang="da-DK" sz="2400" b="0" i="1" dirty="0" smtClean="0">
                               <a:latin typeface="Cambria Math" panose="02040503050406030204" pitchFamily="18" charset="0"/>
                             </a:rPr>
                           </m:ctrlPr>
                         </m:sSubPr>
                         <m:e>
                           <m:r>
-                            <a:rPr lang="da-DK" b="0" i="1" dirty="0" smtClean="0">
+                            <a:rPr lang="da-DK" sz="2400" b="0" i="1" dirty="0" smtClean="0">
                               <a:latin typeface="Cambria Math" panose="02040503050406030204" pitchFamily="18" charset="0"/>
                             </a:rPr>
                             <m:t>𝜓</m:t>
@@ -6983,7 +6979,7 @@
                         </m:e>
                         <m:sub>
                           <m:r>
-                            <a:rPr lang="da-DK" b="0" i="1" dirty="0" smtClean="0">
+                            <a:rPr lang="da-DK" sz="2400" b="0" i="1" dirty="0" smtClean="0">
                               <a:latin typeface="Cambria Math" panose="02040503050406030204" pitchFamily="18" charset="0"/>
                             </a:rPr>
                             <m:t>𝑛</m:t>
@@ -6993,7 +6989,7 @@
                     </m:oMath>
                   </m:oMathPara>
                 </a14:m>
-                <a:endParaRPr lang="en-DK" dirty="0"/>
+                <a:endParaRPr lang="en-DK" sz="2400" dirty="0"/>
               </a:p>
             </p:txBody>
           </p:sp>
@@ -7024,7 +7020,7 @@
               <a:blipFill>
                 <a:blip r:embed="rId6"/>
                 <a:stretch>
-                  <a:fillRect/>
+                  <a:fillRect l="-6796"/>
                 </a:stretch>
               </a:blipFill>
               <a:ln>
@@ -7062,8 +7058,8 @@
         </p:nvSpPr>
         <p:spPr>
           <a:xfrm>
-            <a:off x="5224552" y="4444326"/>
-            <a:ext cx="609600" cy="369332"/>
+            <a:off x="5111377" y="4476689"/>
+            <a:ext cx="609600" cy="461665"/>
           </a:xfrm>
           <a:prstGeom prst="rect">
             <a:avLst/>
@@ -7077,7 +7073,7 @@
           <a:lstStyle/>
           <a:p>
             <a:r>
-              <a:rPr lang="en-DK" b="1" dirty="0">
+              <a:rPr lang="en-DK" sz="2400" b="1" dirty="0">
                 <a:latin typeface="Helvetica" pitchFamily="2" charset="0"/>
               </a:rPr>
               <a:t>N</a:t>
@@ -7109,7 +7105,7 @@
           <a:prstGeom prst="straightConnector1">
             <a:avLst/>
           </a:prstGeom>
-          <a:ln>
+          <a:ln w="38100">
             <a:headEnd type="none" w="med" len="med"/>
             <a:tailEnd type="triangle" w="med" len="med"/>
           </a:ln>
@@ -7153,7 +7149,7 @@
           <a:prstGeom prst="straightConnector1">
             <a:avLst/>
           </a:prstGeom>
-          <a:ln>
+          <a:ln w="38100">
             <a:tailEnd type="triangle"/>
           </a:ln>
         </p:spPr>
@@ -7183,19 +7179,19 @@
           </p:cNvPr>
           <p:cNvCxnSpPr>
             <a:cxnSpLocks/>
-            <a:endCxn id="5" idx="4"/>
+            <a:endCxn id="5" idx="2"/>
           </p:cNvCxnSpPr>
           <p:nvPr/>
         </p:nvCxnSpPr>
         <p:spPr>
-          <a:xfrm flipV="1">
-            <a:off x="4696421" y="4722133"/>
-            <a:ext cx="0" cy="536748"/>
+          <a:xfrm>
+            <a:off x="3675355" y="4412761"/>
+            <a:ext cx="711694" cy="0"/>
           </a:xfrm>
           <a:prstGeom prst="straightConnector1">
             <a:avLst/>
           </a:prstGeom>
-          <a:ln>
+          <a:ln w="38100">
             <a:headEnd type="oval" w="med" len="med"/>
             <a:tailEnd type="triangle" w="med" len="med"/>
           </a:ln>
@@ -7234,12 +7230,12 @@
         <p:spPr>
           <a:xfrm flipH="1" flipV="1">
             <a:off x="4915180" y="3576267"/>
-            <a:ext cx="1396143" cy="226461"/>
+            <a:ext cx="1072902" cy="226461"/>
           </a:xfrm>
           <a:prstGeom prst="straightConnector1">
             <a:avLst/>
           </a:prstGeom>
-          <a:ln>
+          <a:ln w="38100">
             <a:tailEnd type="triangle"/>
           </a:ln>
         </p:spPr>
@@ -7274,8 +7270,8 @@
             </p:nvSpPr>
             <p:spPr>
               <a:xfrm>
-                <a:off x="3023828" y="3146209"/>
-                <a:ext cx="293268" cy="369332"/>
+                <a:off x="3312766" y="3126675"/>
+                <a:ext cx="293268" cy="461665"/>
               </a:xfrm>
               <a:prstGeom prst="rect">
                 <a:avLst/>
@@ -7295,7 +7291,7 @@
                     </m:oMathParaPr>
                     <m:oMath xmlns:m="http://schemas.openxmlformats.org/officeDocument/2006/math">
                       <m:r>
-                        <a:rPr lang="da-DK" b="0" i="1" smtClean="0">
+                        <a:rPr lang="da-DK" sz="2400" b="0" i="1" smtClean="0">
                           <a:latin typeface="Cambria Math" panose="02040503050406030204" pitchFamily="18" charset="0"/>
                         </a:rPr>
                         <m:t>𝜎</m:t>
@@ -7303,7 +7299,7 @@
                     </m:oMath>
                   </m:oMathPara>
                 </a14:m>
-                <a:endParaRPr lang="en-DK" dirty="0"/>
+                <a:endParaRPr lang="en-DK" sz="2400" dirty="0"/>
               </a:p>
             </p:txBody>
           </p:sp>
@@ -7325,8 +7321,8 @@
             </p:nvSpPr>
             <p:spPr>
               <a:xfrm>
-                <a:off x="3023828" y="3146209"/>
-                <a:ext cx="293268" cy="369332"/>
+                <a:off x="3312766" y="3126675"/>
+                <a:ext cx="293268" cy="461665"/>
               </a:xfrm>
               <a:prstGeom prst="rect">
                 <a:avLst/>
@@ -7334,7 +7330,7 @@
               <a:blipFill>
                 <a:blip r:embed="rId7"/>
                 <a:stretch>
-                  <a:fillRect l="-4167"/>
+                  <a:fillRect l="-18367"/>
                 </a:stretch>
               </a:blipFill>
             </p:spPr>
@@ -7368,14 +7364,14 @@
           <p:nvPr/>
         </p:nvCxnSpPr>
         <p:spPr>
-          <a:xfrm flipV="1">
-            <a:off x="3419514" y="3357508"/>
-            <a:ext cx="967535" cy="1168"/>
+          <a:xfrm>
+            <a:off x="3675355" y="3357508"/>
+            <a:ext cx="711694" cy="0"/>
           </a:xfrm>
           <a:prstGeom prst="straightConnector1">
             <a:avLst/>
           </a:prstGeom>
-          <a:ln>
+          <a:ln w="38100">
             <a:headEnd type="oval" w="med" len="med"/>
             <a:tailEnd type="triangle" w="med" len="med"/>
           </a:ln>
@@ -7456,14 +7452,14 @@
                       <m:sSubSup>
                         <m:sSubSupPr>
                           <m:ctrlPr>
-                            <a:rPr lang="da-DK" b="0" i="1" smtClean="0">
+                            <a:rPr lang="da-DK" sz="2400" b="0" i="1" smtClean="0">
                               <a:latin typeface="Cambria Math" panose="02040503050406030204" pitchFamily="18" charset="0"/>
                             </a:rPr>
                           </m:ctrlPr>
                         </m:sSubSupPr>
                         <m:e>
                           <m:r>
-                            <a:rPr lang="da-DK" b="0" i="1" smtClean="0">
+                            <a:rPr lang="da-DK" sz="2400" b="0" i="1" smtClean="0">
                               <a:latin typeface="Cambria Math" panose="02040503050406030204" pitchFamily="18" charset="0"/>
                             </a:rPr>
                             <m:t>𝑥</m:t>
@@ -7471,7 +7467,7 @@
                         </m:e>
                         <m:sub>
                           <m:r>
-                            <a:rPr lang="da-DK" b="0" i="1" smtClean="0">
+                            <a:rPr lang="da-DK" sz="2400" b="0" i="1" smtClean="0">
                               <a:latin typeface="Cambria Math" panose="02040503050406030204" pitchFamily="18" charset="0"/>
                             </a:rPr>
                             <m:t>𝑛</m:t>
@@ -7479,7 +7475,7 @@
                         </m:sub>
                         <m:sup>
                           <m:r>
-                            <a:rPr lang="da-DK" b="0" i="1" smtClean="0">
+                            <a:rPr lang="da-DK" sz="2400" b="0" i="1" smtClean="0">
                               <a:latin typeface="Cambria Math" panose="02040503050406030204" pitchFamily="18" charset="0"/>
                             </a:rPr>
                             <m:t>∗</m:t>
@@ -7489,7 +7485,7 @@
                     </m:oMath>
                   </m:oMathPara>
                 </a14:m>
-                <a:endParaRPr lang="en-DK" dirty="0"/>
+                <a:endParaRPr lang="en-DK" sz="2400" dirty="0"/>
               </a:p>
             </p:txBody>
           </p:sp>
@@ -7568,7 +7564,7 @@
           <a:prstGeom prst="straightConnector1">
             <a:avLst/>
           </a:prstGeom>
-          <a:ln>
+          <a:ln w="38100">
             <a:headEnd type="none" w="med" len="med"/>
             <a:tailEnd type="triangle" w="med" len="med"/>
           </a:ln>
@@ -7604,7 +7600,7 @@
             </p:nvSpPr>
             <p:spPr>
               <a:xfrm>
-                <a:off x="5988294" y="2470464"/>
+                <a:off x="5867188" y="2470464"/>
                 <a:ext cx="618744" cy="618744"/>
               </a:xfrm>
               <a:prstGeom prst="ellipse">
@@ -7642,7 +7638,7 @@
                     </m:oMathParaPr>
                     <m:oMath xmlns:m="http://schemas.openxmlformats.org/officeDocument/2006/math">
                       <m:r>
-                        <a:rPr lang="da-DK" b="0" i="1" smtClean="0">
+                        <a:rPr lang="da-DK" sz="2400" b="0" i="1" smtClean="0">
                           <a:latin typeface="Cambria Math" panose="02040503050406030204" pitchFamily="18" charset="0"/>
                         </a:rPr>
                         <m:t>𝜃</m:t>
@@ -7650,7 +7646,7 @@
                     </m:oMath>
                   </m:oMathPara>
                 </a14:m>
-                <a:endParaRPr lang="en-DK" dirty="0"/>
+                <a:endParaRPr lang="en-DK" sz="2400" dirty="0"/>
               </a:p>
             </p:txBody>
           </p:sp>
@@ -7672,7 +7668,7 @@
             </p:nvSpPr>
             <p:spPr>
               <a:xfrm>
-                <a:off x="5988294" y="2470464"/>
+                <a:off x="5867188" y="2470464"/>
                 <a:ext cx="618744" cy="618744"/>
               </a:xfrm>
               <a:prstGeom prst="ellipse">
@@ -7724,12 +7720,12 @@
         <p:spPr>
           <a:xfrm flipH="1">
             <a:off x="5005793" y="2998595"/>
-            <a:ext cx="1073114" cy="358913"/>
+            <a:ext cx="952008" cy="358913"/>
           </a:xfrm>
           <a:prstGeom prst="straightConnector1">
             <a:avLst/>
           </a:prstGeom>
-          <a:ln>
+          <a:ln w="38100">
             <a:tailEnd type="triangle"/>
           </a:ln>
         </p:spPr>

</xml_diff>